<commit_message>
Instructor notes, optional form validation, and advanced to do list
</commit_message>
<xml_diff>
--- a/Week_07_Forms/13_/slides/Forms_and_inputs.pptx
+++ b/Week_07_Forms/13_/slides/Forms_and_inputs.pptx
@@ -5,7 +5,7 @@
     <p:sldMasterId id="2147483648" r:id="rId1"/>
   </p:sldMasterIdLst>
   <p:notesMasterIdLst>
-    <p:notesMasterId r:id="rId14"/>
+    <p:notesMasterId r:id="rId17"/>
   </p:notesMasterIdLst>
   <p:sldIdLst>
     <p:sldId id="256" r:id="rId2"/>
@@ -20,6 +20,9 @@
     <p:sldId id="260" r:id="rId11"/>
     <p:sldId id="267" r:id="rId12"/>
     <p:sldId id="266" r:id="rId13"/>
+    <p:sldId id="268" r:id="rId14"/>
+    <p:sldId id="269" r:id="rId15"/>
+    <p:sldId id="270" r:id="rId16"/>
   </p:sldIdLst>
   <p:sldSz cx="9144000" cy="6858000" type="screen4x3"/>
   <p:notesSz cx="6858000" cy="9144000"/>
@@ -1685,11 +1688,11 @@
   <p:clrMapOvr>
     <a:masterClrMapping/>
   </p:clrMapOvr>
-  <mc:AlternateContent xmlns:mc="http://schemas.openxmlformats.org/markup-compatibility/2006">
-    <mc:Choice xmlns:p14="http://schemas.microsoft.com/office/powerpoint/2010/main" Requires="p14">
+  <mc:AlternateContent xmlns:mc="http://schemas.openxmlformats.org/markup-compatibility/2006" xmlns:p14="http://schemas.microsoft.com/office/powerpoint/2010/main">
+    <mc:Choice Requires="p14">
       <p:transition spd="slow" p14:dur="2000"/>
     </mc:Choice>
-    <mc:Fallback>
+    <mc:Fallback xmlns="">
       <p:transition spd="slow"/>
     </mc:Fallback>
   </mc:AlternateContent>
@@ -4158,11 +4161,11 @@
   <p:clrMapOvr>
     <a:masterClrMapping/>
   </p:clrMapOvr>
-  <mc:AlternateContent xmlns:mc="http://schemas.openxmlformats.org/markup-compatibility/2006">
-    <mc:Choice xmlns:p14="http://schemas.microsoft.com/office/powerpoint/2010/main" Requires="p14">
+  <mc:AlternateContent xmlns:mc="http://schemas.openxmlformats.org/markup-compatibility/2006" xmlns:p14="http://schemas.microsoft.com/office/powerpoint/2010/main">
+    <mc:Choice Requires="p14">
       <p:transition spd="slow" p14:dur="2000"/>
     </mc:Choice>
-    <mc:Fallback>
+    <mc:Fallback xmlns="">
       <p:transition spd="slow"/>
     </mc:Fallback>
   </mc:AlternateContent>
@@ -4888,11 +4891,11 @@
   <p:clrMapOvr>
     <a:masterClrMapping/>
   </p:clrMapOvr>
-  <mc:AlternateContent xmlns:mc="http://schemas.openxmlformats.org/markup-compatibility/2006">
-    <mc:Choice xmlns:p14="http://schemas.microsoft.com/office/powerpoint/2010/main" Requires="p14">
+  <mc:AlternateContent xmlns:mc="http://schemas.openxmlformats.org/markup-compatibility/2006" xmlns:p14="http://schemas.microsoft.com/office/powerpoint/2010/main">
+    <mc:Choice Requires="p14">
       <p:transition spd="slow" p14:dur="2000"/>
     </mc:Choice>
-    <mc:Fallback>
+    <mc:Fallback xmlns="">
       <p:transition spd="slow"/>
     </mc:Fallback>
   </mc:AlternateContent>
@@ -5096,11 +5099,11 @@
   <p:clrMapOvr>
     <a:masterClrMapping/>
   </p:clrMapOvr>
-  <mc:AlternateContent xmlns:mc="http://schemas.openxmlformats.org/markup-compatibility/2006">
-    <mc:Choice xmlns:p14="http://schemas.microsoft.com/office/powerpoint/2010/main" Requires="p14">
+  <mc:AlternateContent xmlns:mc="http://schemas.openxmlformats.org/markup-compatibility/2006" xmlns:p14="http://schemas.microsoft.com/office/powerpoint/2010/main">
+    <mc:Choice Requires="p14">
       <p:transition spd="slow" p14:dur="2000"/>
     </mc:Choice>
-    <mc:Fallback>
+    <mc:Fallback xmlns="">
       <p:transition spd="slow"/>
     </mc:Fallback>
   </mc:AlternateContent>
@@ -5245,11 +5248,11 @@
   <p:clrMapOvr>
     <a:masterClrMapping/>
   </p:clrMapOvr>
-  <mc:AlternateContent xmlns:mc="http://schemas.openxmlformats.org/markup-compatibility/2006">
-    <mc:Choice xmlns:p14="http://schemas.microsoft.com/office/powerpoint/2010/main" Requires="p14">
+  <mc:AlternateContent xmlns:mc="http://schemas.openxmlformats.org/markup-compatibility/2006" xmlns:p14="http://schemas.microsoft.com/office/powerpoint/2010/main">
+    <mc:Choice Requires="p14">
       <p:transition spd="slow" p14:dur="2000"/>
     </mc:Choice>
-    <mc:Fallback>
+    <mc:Fallback xmlns="">
       <p:transition spd="slow"/>
     </mc:Fallback>
   </mc:AlternateContent>
@@ -5260,6 +5263,438 @@
       </p:par>
     </p:tnLst>
   </p:timing>
+</p:sld>
+</file>
+
+<file path=ppt/slides/slide13.xml><?xml version="1.0" encoding="utf-8"?>
+<p:sld xmlns:a="http://schemas.openxmlformats.org/drawingml/2006/main" xmlns:r="http://schemas.openxmlformats.org/officeDocument/2006/relationships" xmlns:p="http://schemas.openxmlformats.org/presentationml/2006/main">
+  <p:cSld>
+    <p:spTree>
+      <p:nvGrpSpPr>
+        <p:cNvPr id="1" name=""/>
+        <p:cNvGrpSpPr/>
+        <p:nvPr/>
+      </p:nvGrpSpPr>
+      <p:grpSpPr>
+        <a:xfrm>
+          <a:off x="0" y="0"/>
+          <a:ext cx="0" cy="0"/>
+          <a:chOff x="0" y="0"/>
+          <a:chExt cx="0" cy="0"/>
+        </a:xfrm>
+      </p:grpSpPr>
+      <p:sp>
+        <p:nvSpPr>
+          <p:cNvPr id="4" name="Title 3"/>
+          <p:cNvSpPr>
+            <a:spLocks noGrp="1"/>
+          </p:cNvSpPr>
+          <p:nvPr>
+            <p:ph type="ctrTitle"/>
+          </p:nvPr>
+        </p:nvSpPr>
+        <p:spPr/>
+        <p:txBody>
+          <a:bodyPr/>
+          <a:lstStyle/>
+          <a:p>
+            <a:r>
+              <a:rPr lang="en-US" dirty="0" smtClean="0"/>
+              <a:t>Lab</a:t>
+            </a:r>
+            <a:endParaRPr lang="en-US" dirty="0"/>
+          </a:p>
+        </p:txBody>
+      </p:sp>
+      <p:sp>
+        <p:nvSpPr>
+          <p:cNvPr id="5" name="Subtitle 4"/>
+          <p:cNvSpPr>
+            <a:spLocks noGrp="1"/>
+          </p:cNvSpPr>
+          <p:nvPr>
+            <p:ph type="subTitle" idx="1"/>
+          </p:nvPr>
+        </p:nvSpPr>
+        <p:spPr/>
+        <p:txBody>
+          <a:bodyPr/>
+          <a:lstStyle/>
+          <a:p>
+            <a:r>
+              <a:rPr lang="en-US" dirty="0" smtClean="0"/>
+              <a:t>Optional: </a:t>
+            </a:r>
+            <a:r>
+              <a:rPr lang="en-US" dirty="0" err="1" smtClean="0"/>
+              <a:t>Form_Search</a:t>
+            </a:r>
+            <a:r>
+              <a:rPr lang="en-US" dirty="0" smtClean="0"/>
+              <a:t> (show ? Get </a:t>
+            </a:r>
+            <a:r>
+              <a:rPr lang="en-US" dirty="0" err="1" smtClean="0"/>
+              <a:t>params</a:t>
+            </a:r>
+            <a:r>
+              <a:rPr lang="en-US" smtClean="0"/>
+              <a:t>)</a:t>
+            </a:r>
+          </a:p>
+          <a:p>
+            <a:r>
+              <a:rPr lang="en-US" dirty="0" smtClean="0"/>
+              <a:t>GA Application form</a:t>
+            </a:r>
+            <a:endParaRPr lang="en-US" dirty="0"/>
+          </a:p>
+        </p:txBody>
+      </p:sp>
+    </p:spTree>
+    <p:extLst>
+      <p:ext uri="{BB962C8B-B14F-4D97-AF65-F5344CB8AC3E}">
+        <p14:creationId xmlns:p14="http://schemas.microsoft.com/office/powerpoint/2010/main" val="2856347897"/>
+      </p:ext>
+    </p:extLst>
+  </p:cSld>
+  <p:clrMapOvr>
+    <a:masterClrMapping/>
+  </p:clrMapOvr>
+</p:sld>
+</file>
+
+<file path=ppt/slides/slide14.xml><?xml version="1.0" encoding="utf-8"?>
+<p:sld xmlns:a="http://schemas.openxmlformats.org/drawingml/2006/main" xmlns:r="http://schemas.openxmlformats.org/officeDocument/2006/relationships" xmlns:p="http://schemas.openxmlformats.org/presentationml/2006/main">
+  <p:cSld>
+    <p:spTree>
+      <p:nvGrpSpPr>
+        <p:cNvPr id="1" name=""/>
+        <p:cNvGrpSpPr/>
+        <p:nvPr/>
+      </p:nvGrpSpPr>
+      <p:grpSpPr>
+        <a:xfrm>
+          <a:off x="0" y="0"/>
+          <a:ext cx="0" cy="0"/>
+          <a:chOff x="0" y="0"/>
+          <a:chExt cx="0" cy="0"/>
+        </a:xfrm>
+      </p:grpSpPr>
+      <p:sp>
+        <p:nvSpPr>
+          <p:cNvPr id="2" name="Title 1"/>
+          <p:cNvSpPr>
+            <a:spLocks noGrp="1"/>
+          </p:cNvSpPr>
+          <p:nvPr>
+            <p:ph type="title"/>
+          </p:nvPr>
+        </p:nvSpPr>
+        <p:spPr/>
+        <p:txBody>
+          <a:bodyPr/>
+          <a:lstStyle/>
+          <a:p>
+            <a:r>
+              <a:rPr lang="en-US" dirty="0" smtClean="0"/>
+              <a:t>Optional: </a:t>
+            </a:r>
+            <a:r>
+              <a:rPr lang="en-US" dirty="0" err="1" smtClean="0"/>
+              <a:t>Fieldset</a:t>
+            </a:r>
+            <a:r>
+              <a:rPr lang="en-US" dirty="0" smtClean="0"/>
+              <a:t>/Legend</a:t>
+            </a:r>
+            <a:endParaRPr lang="en-US" dirty="0"/>
+          </a:p>
+        </p:txBody>
+      </p:sp>
+      <p:sp>
+        <p:nvSpPr>
+          <p:cNvPr id="3" name="Content Placeholder 2"/>
+          <p:cNvSpPr>
+            <a:spLocks noGrp="1"/>
+          </p:cNvSpPr>
+          <p:nvPr>
+            <p:ph idx="1"/>
+          </p:nvPr>
+        </p:nvSpPr>
+        <p:spPr/>
+        <p:txBody>
+          <a:bodyPr>
+            <a:normAutofit fontScale="77500" lnSpcReduction="20000"/>
+          </a:bodyPr>
+          <a:lstStyle/>
+          <a:p>
+            <a:r>
+              <a:rPr lang="en-US" dirty="0" smtClean="0"/>
+              <a:t>&lt;</a:t>
+            </a:r>
+            <a:r>
+              <a:rPr lang="en-US" dirty="0" err="1" smtClean="0"/>
+              <a:t>fieldset</a:t>
+            </a:r>
+            <a:r>
+              <a:rPr lang="en-US" dirty="0" smtClean="0"/>
+              <a:t>&gt;</a:t>
+            </a:r>
+          </a:p>
+          <a:p>
+            <a:pPr lvl="1"/>
+            <a:r>
+              <a:rPr lang="en-US" dirty="0" smtClean="0"/>
+              <a:t>Wrapper for grouped form elements</a:t>
+            </a:r>
+          </a:p>
+          <a:p>
+            <a:pPr lvl="1"/>
+            <a:r>
+              <a:rPr lang="en-US" dirty="0" smtClean="0"/>
+              <a:t>Ex: First, middle, last name text fields</a:t>
+            </a:r>
+          </a:p>
+          <a:p>
+            <a:r>
+              <a:rPr lang="en-US" dirty="0" smtClean="0"/>
+              <a:t>&lt;legend&gt;</a:t>
+            </a:r>
+          </a:p>
+          <a:p>
+            <a:pPr lvl="1"/>
+            <a:r>
+              <a:rPr lang="en-US" dirty="0" smtClean="0"/>
+              <a:t>Goes inside </a:t>
+            </a:r>
+            <a:r>
+              <a:rPr lang="en-US" dirty="0" err="1" smtClean="0"/>
+              <a:t>fieldset</a:t>
+            </a:r>
+            <a:endParaRPr lang="en-US" dirty="0" smtClean="0"/>
+          </a:p>
+          <a:p>
+            <a:pPr lvl="1"/>
+            <a:r>
+              <a:rPr lang="en-US" dirty="0" smtClean="0"/>
+              <a:t>Defines the grouping term for the </a:t>
+            </a:r>
+            <a:r>
+              <a:rPr lang="en-US" dirty="0" err="1" smtClean="0"/>
+              <a:t>fieldset</a:t>
+            </a:r>
+            <a:endParaRPr lang="en-US" dirty="0" smtClean="0"/>
+          </a:p>
+          <a:p>
+            <a:pPr marL="0" indent="0">
+              <a:buNone/>
+            </a:pPr>
+            <a:r>
+              <a:rPr lang="en-US" dirty="0" smtClean="0"/>
+              <a:t>&lt;</a:t>
+            </a:r>
+            <a:r>
+              <a:rPr lang="en-US" dirty="0" err="1" smtClean="0"/>
+              <a:t>fieldset</a:t>
+            </a:r>
+            <a:r>
+              <a:rPr lang="en-US" dirty="0" smtClean="0"/>
+              <a:t>&gt;</a:t>
+            </a:r>
+          </a:p>
+          <a:p>
+            <a:pPr marL="0" indent="0">
+              <a:buNone/>
+            </a:pPr>
+            <a:r>
+              <a:rPr lang="en-US" dirty="0"/>
+              <a:t>	</a:t>
+            </a:r>
+            <a:r>
+              <a:rPr lang="en-US" dirty="0" smtClean="0"/>
+              <a:t>&lt;legend&gt;Your Name&lt;/legend&gt;</a:t>
+            </a:r>
+          </a:p>
+          <a:p>
+            <a:pPr marL="0" indent="0">
+              <a:buNone/>
+            </a:pPr>
+            <a:r>
+              <a:rPr lang="en-US" dirty="0"/>
+              <a:t>	</a:t>
+            </a:r>
+            <a:r>
+              <a:rPr lang="en-US" dirty="0" smtClean="0"/>
+              <a:t>&lt;input type=“text” name=“</a:t>
+            </a:r>
+            <a:r>
+              <a:rPr lang="en-US" dirty="0" err="1" smtClean="0"/>
+              <a:t>first_name</a:t>
+            </a:r>
+            <a:r>
+              <a:rPr lang="en-US" dirty="0" smtClean="0"/>
+              <a:t>”&gt;</a:t>
+            </a:r>
+          </a:p>
+          <a:p>
+            <a:pPr marL="0" indent="0">
+              <a:buNone/>
+            </a:pPr>
+            <a:r>
+              <a:rPr lang="en-US" dirty="0"/>
+              <a:t>	</a:t>
+            </a:r>
+            <a:r>
+              <a:rPr lang="en-US" dirty="0" smtClean="0"/>
+              <a:t>&lt;input type=“text” name=“</a:t>
+            </a:r>
+            <a:r>
+              <a:rPr lang="en-US" dirty="0" err="1" smtClean="0"/>
+              <a:t>middle_name</a:t>
+            </a:r>
+            <a:r>
+              <a:rPr lang="en-US" dirty="0" smtClean="0"/>
+              <a:t>”&gt;</a:t>
+            </a:r>
+          </a:p>
+          <a:p>
+            <a:pPr marL="0" indent="0">
+              <a:buNone/>
+            </a:pPr>
+            <a:r>
+              <a:rPr lang="en-US" dirty="0"/>
+              <a:t>	</a:t>
+            </a:r>
+            <a:r>
+              <a:rPr lang="en-US" dirty="0" smtClean="0"/>
+              <a:t>&lt;input type=“text” name=“</a:t>
+            </a:r>
+            <a:r>
+              <a:rPr lang="en-US" dirty="0" err="1" smtClean="0"/>
+              <a:t>last_name</a:t>
+            </a:r>
+            <a:r>
+              <a:rPr lang="en-US" smtClean="0"/>
+              <a:t>”&gt;</a:t>
+            </a:r>
+            <a:endParaRPr lang="en-US" dirty="0" smtClean="0"/>
+          </a:p>
+          <a:p>
+            <a:pPr marL="0" indent="0">
+              <a:buNone/>
+            </a:pPr>
+            <a:r>
+              <a:rPr lang="en-US" dirty="0" smtClean="0"/>
+              <a:t>&lt;/</a:t>
+            </a:r>
+            <a:r>
+              <a:rPr lang="en-US" dirty="0" err="1" smtClean="0"/>
+              <a:t>fieldset</a:t>
+            </a:r>
+            <a:r>
+              <a:rPr lang="en-US" dirty="0" smtClean="0"/>
+              <a:t>&gt;</a:t>
+            </a:r>
+          </a:p>
+        </p:txBody>
+      </p:sp>
+    </p:spTree>
+    <p:extLst>
+      <p:ext uri="{BB962C8B-B14F-4D97-AF65-F5344CB8AC3E}">
+        <p14:creationId xmlns:p14="http://schemas.microsoft.com/office/powerpoint/2010/main" val="392103459"/>
+      </p:ext>
+    </p:extLst>
+  </p:cSld>
+  <p:clrMapOvr>
+    <a:masterClrMapping/>
+  </p:clrMapOvr>
+</p:sld>
+</file>
+
+<file path=ppt/slides/slide15.xml><?xml version="1.0" encoding="utf-8"?>
+<p:sld xmlns:a="http://schemas.openxmlformats.org/drawingml/2006/main" xmlns:r="http://schemas.openxmlformats.org/officeDocument/2006/relationships" xmlns:p="http://schemas.openxmlformats.org/presentationml/2006/main">
+  <p:cSld>
+    <p:spTree>
+      <p:nvGrpSpPr>
+        <p:cNvPr id="1" name=""/>
+        <p:cNvGrpSpPr/>
+        <p:nvPr/>
+      </p:nvGrpSpPr>
+      <p:grpSpPr>
+        <a:xfrm>
+          <a:off x="0" y="0"/>
+          <a:ext cx="0" cy="0"/>
+          <a:chOff x="0" y="0"/>
+          <a:chExt cx="0" cy="0"/>
+        </a:xfrm>
+      </p:grpSpPr>
+      <p:sp>
+        <p:nvSpPr>
+          <p:cNvPr id="2" name="Title 1"/>
+          <p:cNvSpPr>
+            <a:spLocks noGrp="1"/>
+          </p:cNvSpPr>
+          <p:nvPr>
+            <p:ph type="title"/>
+          </p:nvPr>
+        </p:nvSpPr>
+        <p:spPr/>
+        <p:txBody>
+          <a:bodyPr/>
+          <a:lstStyle/>
+          <a:p>
+            <a:r>
+              <a:rPr lang="en-US" dirty="0" smtClean="0"/>
+              <a:t>Optional: Validation</a:t>
+            </a:r>
+            <a:endParaRPr lang="en-US" dirty="0"/>
+          </a:p>
+        </p:txBody>
+      </p:sp>
+      <p:sp>
+        <p:nvSpPr>
+          <p:cNvPr id="3" name="Content Placeholder 2"/>
+          <p:cNvSpPr>
+            <a:spLocks noGrp="1"/>
+          </p:cNvSpPr>
+          <p:nvPr>
+            <p:ph idx="1"/>
+          </p:nvPr>
+        </p:nvSpPr>
+        <p:spPr/>
+        <p:txBody>
+          <a:bodyPr/>
+          <a:lstStyle/>
+          <a:p>
+            <a:r>
+              <a:rPr lang="en-US" smtClean="0"/>
+              <a:t>Use </a:t>
+            </a:r>
+            <a:r>
+              <a:rPr lang="en-US" dirty="0" smtClean="0"/>
+              <a:t>library or simple if/else statements</a:t>
+            </a:r>
+          </a:p>
+          <a:p>
+            <a:r>
+              <a:rPr lang="en-US" dirty="0" smtClean="0"/>
+              <a:t>Parsley.js is an easy library to show off</a:t>
+            </a:r>
+            <a:endParaRPr lang="en-US" dirty="0"/>
+          </a:p>
+        </p:txBody>
+      </p:sp>
+    </p:spTree>
+    <p:extLst>
+      <p:ext uri="{BB962C8B-B14F-4D97-AF65-F5344CB8AC3E}">
+        <p14:creationId xmlns:p14="http://schemas.microsoft.com/office/powerpoint/2010/main" val="3122595299"/>
+      </p:ext>
+    </p:extLst>
+  </p:cSld>
+  <p:clrMapOvr>
+    <a:masterClrMapping/>
+  </p:clrMapOvr>
 </p:sld>
 </file>
 
@@ -5537,11 +5972,11 @@
   <p:clrMapOvr>
     <a:masterClrMapping/>
   </p:clrMapOvr>
-  <mc:AlternateContent xmlns:mc="http://schemas.openxmlformats.org/markup-compatibility/2006">
-    <mc:Choice xmlns:p14="http://schemas.microsoft.com/office/powerpoint/2010/main" Requires="p14">
+  <mc:AlternateContent xmlns:mc="http://schemas.openxmlformats.org/markup-compatibility/2006" xmlns:p14="http://schemas.microsoft.com/office/powerpoint/2010/main">
+    <mc:Choice Requires="p14">
       <p:transition spd="slow" p14:dur="2000"/>
     </mc:Choice>
-    <mc:Fallback>
+    <mc:Fallback xmlns="">
       <p:transition spd="slow"/>
     </mc:Fallback>
   </mc:AlternateContent>
@@ -5683,13 +6118,7 @@
               <a:rPr lang="en-US" dirty="0" smtClean="0">
                 <a:ea typeface="MS PGothic" pitchFamily="34" charset="-128"/>
               </a:rPr>
-              <a:t>&lt;form&gt;&lt;/form</a:t>
-            </a:r>
-            <a:r>
-              <a:rPr lang="en-US" dirty="0" smtClean="0">
-                <a:ea typeface="MS PGothic" pitchFamily="34" charset="-128"/>
-              </a:rPr>
-              <a:t>&gt;</a:t>
+              <a:t>&lt;form&gt;&lt;/form&gt;</a:t>
             </a:r>
           </a:p>
           <a:p>
@@ -5707,9 +6136,6 @@
               </a:rPr>
               <a:t>Attributes</a:t>
             </a:r>
-            <a:endParaRPr lang="en-US" dirty="0" smtClean="0">
-              <a:ea typeface="MS PGothic" pitchFamily="34" charset="-128"/>
-            </a:endParaRPr>
           </a:p>
           <a:p>
             <a:pPr marL="749300" lvl="1" indent="-457200">
@@ -5785,17 +6211,8 @@
               <a:rPr lang="en-US" dirty="0" smtClean="0">
                 <a:ea typeface="MS PGothic" pitchFamily="34" charset="-128"/>
               </a:rPr>
-              <a:t> </a:t>
-            </a:r>
-            <a:r>
-              <a:rPr lang="en-US" dirty="0" smtClean="0">
-                <a:ea typeface="MS PGothic" pitchFamily="34" charset="-128"/>
-              </a:rPr>
-              <a:t>to send data to</a:t>
-            </a:r>
-            <a:endParaRPr lang="en-US" dirty="0" smtClean="0">
-              <a:ea typeface="MS PGothic" pitchFamily="34" charset="-128"/>
-            </a:endParaRPr>
+              <a:t> to send data to</a:t>
+            </a:r>
           </a:p>
           <a:p>
             <a:pPr marL="749300" lvl="1" indent="-457200">
@@ -5831,13 +6248,7 @@
               <a:rPr lang="en-US" dirty="0" smtClean="0">
                 <a:ea typeface="MS PGothic" pitchFamily="34" charset="-128"/>
               </a:rPr>
-              <a:t>Multipart/form-data if uploading </a:t>
-            </a:r>
-            <a:r>
-              <a:rPr lang="en-US" dirty="0" smtClean="0">
-                <a:ea typeface="MS PGothic" pitchFamily="34" charset="-128"/>
-              </a:rPr>
-              <a:t>files</a:t>
+              <a:t>Multipart/form-data if uploading files</a:t>
             </a:r>
           </a:p>
           <a:p>
@@ -5880,11 +6291,11 @@
   <p:clrMapOvr>
     <a:masterClrMapping/>
   </p:clrMapOvr>
-  <mc:AlternateContent xmlns:mc="http://schemas.openxmlformats.org/markup-compatibility/2006">
-    <mc:Choice xmlns:p14="http://schemas.microsoft.com/office/powerpoint/2010/main" Requires="p14">
+  <mc:AlternateContent xmlns:mc="http://schemas.openxmlformats.org/markup-compatibility/2006" xmlns:p14="http://schemas.microsoft.com/office/powerpoint/2010/main">
+    <mc:Choice Requires="p14">
       <p:transition spd="slow" p14:dur="2000"/>
     </mc:Choice>
-    <mc:Fallback>
+    <mc:Fallback xmlns="">
       <p:transition spd="slow"/>
     </mc:Fallback>
   </mc:AlternateContent>
@@ -6049,11 +6460,11 @@
   <p:clrMapOvr>
     <a:masterClrMapping/>
   </p:clrMapOvr>
-  <mc:AlternateContent xmlns:mc="http://schemas.openxmlformats.org/markup-compatibility/2006">
-    <mc:Choice xmlns:p14="http://schemas.microsoft.com/office/powerpoint/2010/main" Requires="p14">
+  <mc:AlternateContent xmlns:mc="http://schemas.openxmlformats.org/markup-compatibility/2006" xmlns:p14="http://schemas.microsoft.com/office/powerpoint/2010/main">
+    <mc:Choice Requires="p14">
       <p:transition spd="slow" p14:dur="2000"/>
     </mc:Choice>
-    <mc:Fallback>
+    <mc:Fallback xmlns="">
       <p:transition spd="slow"/>
     </mc:Fallback>
   </mc:AlternateContent>
@@ -6343,11 +6754,11 @@
   <p:clrMapOvr>
     <a:masterClrMapping/>
   </p:clrMapOvr>
-  <mc:AlternateContent xmlns:mc="http://schemas.openxmlformats.org/markup-compatibility/2006">
-    <mc:Choice xmlns:p14="http://schemas.microsoft.com/office/powerpoint/2010/main" Requires="p14">
+  <mc:AlternateContent xmlns:mc="http://schemas.openxmlformats.org/markup-compatibility/2006" xmlns:p14="http://schemas.microsoft.com/office/powerpoint/2010/main">
+    <mc:Choice Requires="p14">
       <p:transition spd="slow" p14:dur="2000"/>
     </mc:Choice>
-    <mc:Fallback>
+    <mc:Fallback xmlns="">
       <p:transition spd="slow"/>
     </mc:Fallback>
   </mc:AlternateContent>
@@ -6516,11 +6927,11 @@
   <p:clrMapOvr>
     <a:masterClrMapping/>
   </p:clrMapOvr>
-  <mc:AlternateContent xmlns:mc="http://schemas.openxmlformats.org/markup-compatibility/2006">
-    <mc:Choice xmlns:p14="http://schemas.microsoft.com/office/powerpoint/2010/main" Requires="p14">
+  <mc:AlternateContent xmlns:mc="http://schemas.openxmlformats.org/markup-compatibility/2006" xmlns:p14="http://schemas.microsoft.com/office/powerpoint/2010/main">
+    <mc:Choice Requires="p14">
       <p:transition spd="slow" p14:dur="2000"/>
     </mc:Choice>
-    <mc:Fallback>
+    <mc:Fallback xmlns="">
       <p:transition spd="slow"/>
     </mc:Fallback>
   </mc:AlternateContent>
@@ -6880,11 +7291,11 @@
   <p:clrMapOvr>
     <a:masterClrMapping/>
   </p:clrMapOvr>
-  <mc:AlternateContent xmlns:mc="http://schemas.openxmlformats.org/markup-compatibility/2006">
-    <mc:Choice xmlns:p14="http://schemas.microsoft.com/office/powerpoint/2010/main" Requires="p14">
+  <mc:AlternateContent xmlns:mc="http://schemas.openxmlformats.org/markup-compatibility/2006" xmlns:p14="http://schemas.microsoft.com/office/powerpoint/2010/main">
+    <mc:Choice Requires="p14">
       <p:transition spd="slow" p14:dur="2000"/>
     </mc:Choice>
-    <mc:Fallback>
+    <mc:Fallback xmlns="">
       <p:transition spd="slow"/>
     </mc:Fallback>
   </mc:AlternateContent>
@@ -7028,17 +7439,8 @@
               <a:rPr lang="en-US" dirty="0" smtClean="0">
                 <a:ea typeface="MS PGothic" pitchFamily="34" charset="-128"/>
               </a:rPr>
-              <a:t>Defaults to submit in chrome, submit query in </a:t>
-            </a:r>
-            <a:r>
-              <a:rPr lang="en-US" dirty="0" smtClean="0">
-                <a:ea typeface="MS PGothic" pitchFamily="34" charset="-128"/>
-              </a:rPr>
-              <a:t>IE</a:t>
-            </a:r>
-            <a:endParaRPr lang="en-US" dirty="0" smtClean="0">
-              <a:ea typeface="MS PGothic" pitchFamily="34" charset="-128"/>
-            </a:endParaRPr>
+              <a:t>Defaults to submit in chrome, submit query in IE</a:t>
+            </a:r>
           </a:p>
           <a:p>
             <a:pPr>
@@ -7087,13 +7489,7 @@
               <a:rPr lang="en-US" dirty="0" smtClean="0">
                 <a:ea typeface="MS PGothic" pitchFamily="34" charset="-128"/>
               </a:rPr>
-              <a:t>&lt;</a:t>
-            </a:r>
-            <a:r>
-              <a:rPr lang="en-US" dirty="0" smtClean="0">
-                <a:ea typeface="MS PGothic" pitchFamily="34" charset="-128"/>
-              </a:rPr>
-              <a:t>input type=“button”&gt;</a:t>
+              <a:t>&lt;input type=“button”&gt;</a:t>
             </a:r>
           </a:p>
           <a:p>
@@ -7308,11 +7704,11 @@
   <p:clrMapOvr>
     <a:masterClrMapping/>
   </p:clrMapOvr>
-  <mc:AlternateContent xmlns:mc="http://schemas.openxmlformats.org/markup-compatibility/2006">
-    <mc:Choice xmlns:p14="http://schemas.microsoft.com/office/powerpoint/2010/main" Requires="p14">
+  <mc:AlternateContent xmlns:mc="http://schemas.openxmlformats.org/markup-compatibility/2006" xmlns:p14="http://schemas.microsoft.com/office/powerpoint/2010/main">
+    <mc:Choice Requires="p14">
       <p:transition spd="slow" p14:dur="2000"/>
     </mc:Choice>
-    <mc:Fallback>
+    <mc:Fallback xmlns="">
       <p:transition spd="slow"/>
     </mc:Fallback>
   </mc:AlternateContent>
@@ -7493,13 +7889,7 @@
               <a:rPr lang="en-US" dirty="0" smtClean="0">
                 <a:ea typeface="MS PGothic" pitchFamily="34" charset="-128"/>
               </a:rPr>
-              <a:t>&lt;select</a:t>
-            </a:r>
-            <a:r>
-              <a:rPr lang="en-US" dirty="0" smtClean="0">
-                <a:ea typeface="MS PGothic" pitchFamily="34" charset="-128"/>
-              </a:rPr>
-              <a:t>&gt;</a:t>
+              <a:t>&lt;select&gt;</a:t>
             </a:r>
           </a:p>
           <a:p>
@@ -7523,19 +7913,7 @@
               <a:rPr lang="en-US" dirty="0" smtClean="0">
                 <a:ea typeface="MS PGothic" pitchFamily="34" charset="-128"/>
               </a:rPr>
-              <a:t>&lt;</a:t>
-            </a:r>
-            <a:r>
-              <a:rPr lang="en-US" dirty="0" smtClean="0">
-                <a:ea typeface="MS PGothic" pitchFamily="34" charset="-128"/>
-              </a:rPr>
-              <a:t>option value=“thing1”&gt;thing1&lt;/option</a:t>
-            </a:r>
-            <a:r>
-              <a:rPr lang="en-US" dirty="0" smtClean="0">
-                <a:ea typeface="MS PGothic" pitchFamily="34" charset="-128"/>
-              </a:rPr>
-              <a:t>&gt;</a:t>
+              <a:t>&lt;option value=“thing1”&gt;thing1&lt;/option&gt;</a:t>
             </a:r>
           </a:p>
           <a:p>
@@ -7559,13 +7937,7 @@
               <a:rPr lang="en-US" dirty="0" smtClean="0">
                 <a:ea typeface="MS PGothic" pitchFamily="34" charset="-128"/>
               </a:rPr>
-              <a:t>&lt;</a:t>
-            </a:r>
-            <a:r>
-              <a:rPr lang="en-US" dirty="0" smtClean="0">
-                <a:ea typeface="MS PGothic" pitchFamily="34" charset="-128"/>
-              </a:rPr>
-              <a:t>option value=“thing2”&gt;thing2&lt;/option&gt;</a:t>
+              <a:t>&lt;option value=“thing2”&gt;thing2&lt;/option&gt;</a:t>
             </a:r>
           </a:p>
           <a:p>
@@ -7663,11 +8035,11 @@
   <p:clrMapOvr>
     <a:masterClrMapping/>
   </p:clrMapOvr>
-  <mc:AlternateContent xmlns:mc="http://schemas.openxmlformats.org/markup-compatibility/2006">
-    <mc:Choice xmlns:p14="http://schemas.microsoft.com/office/powerpoint/2010/main" Requires="p14">
+  <mc:AlternateContent xmlns:mc="http://schemas.openxmlformats.org/markup-compatibility/2006" xmlns:p14="http://schemas.microsoft.com/office/powerpoint/2010/main">
+    <mc:Choice Requires="p14">
       <p:transition spd="slow" p14:dur="2000"/>
     </mc:Choice>
-    <mc:Fallback>
+    <mc:Fallback xmlns="">
       <p:transition spd="slow"/>
     </mc:Fallback>
   </mc:AlternateContent>

</xml_diff>